<commit_message>
gonna check the grammar in discussion section
</commit_message>
<xml_diff>
--- a/fig/thesis_fig.pptx
+++ b/fig/thesis_fig.pptx
@@ -2766,7 +2766,7 @@
           <a:p>
             <a:fld id="{164B623C-99B3-4B91-9C27-73C46C74FB0A}" type="datetimeFigureOut">
               <a:rPr kumimoji="1" lang="ja-JP" altLang="en-US" smtClean="0"/>
-              <a:t>2024/8/14</a:t>
+              <a:t>2024/8/22</a:t>
             </a:fld>
             <a:endParaRPr kumimoji="1" lang="ja-JP" altLang="en-US"/>
           </a:p>
@@ -2996,7 +2996,7 @@
           <a:p>
             <a:fld id="{164B623C-99B3-4B91-9C27-73C46C74FB0A}" type="datetimeFigureOut">
               <a:rPr kumimoji="1" lang="ja-JP" altLang="en-US" smtClean="0"/>
-              <a:t>2024/8/14</a:t>
+              <a:t>2024/8/22</a:t>
             </a:fld>
             <a:endParaRPr kumimoji="1" lang="ja-JP" altLang="en-US"/>
           </a:p>
@@ -3236,7 +3236,7 @@
           <a:p>
             <a:fld id="{164B623C-99B3-4B91-9C27-73C46C74FB0A}" type="datetimeFigureOut">
               <a:rPr kumimoji="1" lang="ja-JP" altLang="en-US" smtClean="0"/>
-              <a:t>2024/8/14</a:t>
+              <a:t>2024/8/22</a:t>
             </a:fld>
             <a:endParaRPr kumimoji="1" lang="ja-JP" altLang="en-US"/>
           </a:p>
@@ -3466,7 +3466,7 @@
           <a:p>
             <a:fld id="{164B623C-99B3-4B91-9C27-73C46C74FB0A}" type="datetimeFigureOut">
               <a:rPr kumimoji="1" lang="ja-JP" altLang="en-US" smtClean="0"/>
-              <a:t>2024/8/14</a:t>
+              <a:t>2024/8/22</a:t>
             </a:fld>
             <a:endParaRPr kumimoji="1" lang="ja-JP" altLang="en-US"/>
           </a:p>
@@ -3741,7 +3741,7 @@
           <a:p>
             <a:fld id="{164B623C-99B3-4B91-9C27-73C46C74FB0A}" type="datetimeFigureOut">
               <a:rPr kumimoji="1" lang="ja-JP" altLang="en-US" smtClean="0"/>
-              <a:t>2024/8/14</a:t>
+              <a:t>2024/8/22</a:t>
             </a:fld>
             <a:endParaRPr kumimoji="1" lang="ja-JP" altLang="en-US"/>
           </a:p>
@@ -4070,7 +4070,7 @@
           <a:p>
             <a:fld id="{164B623C-99B3-4B91-9C27-73C46C74FB0A}" type="datetimeFigureOut">
               <a:rPr kumimoji="1" lang="ja-JP" altLang="en-US" smtClean="0"/>
-              <a:t>2024/8/14</a:t>
+              <a:t>2024/8/22</a:t>
             </a:fld>
             <a:endParaRPr kumimoji="1" lang="ja-JP" altLang="en-US"/>
           </a:p>
@@ -4546,7 +4546,7 @@
           <a:p>
             <a:fld id="{164B623C-99B3-4B91-9C27-73C46C74FB0A}" type="datetimeFigureOut">
               <a:rPr kumimoji="1" lang="ja-JP" altLang="en-US" smtClean="0"/>
-              <a:t>2024/8/14</a:t>
+              <a:t>2024/8/22</a:t>
             </a:fld>
             <a:endParaRPr kumimoji="1" lang="ja-JP" altLang="en-US"/>
           </a:p>
@@ -4687,7 +4687,7 @@
           <a:p>
             <a:fld id="{164B623C-99B3-4B91-9C27-73C46C74FB0A}" type="datetimeFigureOut">
               <a:rPr kumimoji="1" lang="ja-JP" altLang="en-US" smtClean="0"/>
-              <a:t>2024/8/14</a:t>
+              <a:t>2024/8/22</a:t>
             </a:fld>
             <a:endParaRPr kumimoji="1" lang="ja-JP" altLang="en-US"/>
           </a:p>
@@ -4800,7 +4800,7 @@
           <a:p>
             <a:fld id="{164B623C-99B3-4B91-9C27-73C46C74FB0A}" type="datetimeFigureOut">
               <a:rPr kumimoji="1" lang="ja-JP" altLang="en-US" smtClean="0"/>
-              <a:t>2024/8/14</a:t>
+              <a:t>2024/8/22</a:t>
             </a:fld>
             <a:endParaRPr kumimoji="1" lang="ja-JP" altLang="en-US"/>
           </a:p>
@@ -5143,7 +5143,7 @@
           <a:p>
             <a:fld id="{164B623C-99B3-4B91-9C27-73C46C74FB0A}" type="datetimeFigureOut">
               <a:rPr kumimoji="1" lang="ja-JP" altLang="en-US" smtClean="0"/>
-              <a:t>2024/8/14</a:t>
+              <a:t>2024/8/22</a:t>
             </a:fld>
             <a:endParaRPr kumimoji="1" lang="ja-JP" altLang="en-US"/>
           </a:p>
@@ -5431,7 +5431,7 @@
           <a:p>
             <a:fld id="{164B623C-99B3-4B91-9C27-73C46C74FB0A}" type="datetimeFigureOut">
               <a:rPr kumimoji="1" lang="ja-JP" altLang="en-US" smtClean="0"/>
-              <a:t>2024/8/14</a:t>
+              <a:t>2024/8/22</a:t>
             </a:fld>
             <a:endParaRPr kumimoji="1" lang="ja-JP" altLang="en-US"/>
           </a:p>
@@ -5704,7 +5704,7 @@
           <a:p>
             <a:fld id="{164B623C-99B3-4B91-9C27-73C46C74FB0A}" type="datetimeFigureOut">
               <a:rPr kumimoji="1" lang="ja-JP" altLang="en-US" smtClean="0"/>
-              <a:t>2024/8/14</a:t>
+              <a:t>2024/8/22</a:t>
             </a:fld>
             <a:endParaRPr kumimoji="1" lang="ja-JP" altLang="en-US"/>
           </a:p>
@@ -7351,10 +7351,10 @@
         </p:nvGrpSpPr>
         <p:grpSpPr>
           <a:xfrm>
-            <a:off x="2628864" y="317349"/>
-            <a:ext cx="8113986" cy="2914668"/>
-            <a:chOff x="2340843" y="311457"/>
-            <a:chExt cx="8113986" cy="2914668"/>
+            <a:off x="2699984" y="165713"/>
+            <a:ext cx="8200926" cy="2997629"/>
+            <a:chOff x="2340843" y="180141"/>
+            <a:chExt cx="8200926" cy="2997629"/>
           </a:xfrm>
         </p:grpSpPr>
         <p:grpSp>
@@ -7371,10 +7371,10 @@
           </p:nvGrpSpPr>
           <p:grpSpPr>
             <a:xfrm>
-              <a:off x="2340843" y="311457"/>
-              <a:ext cx="8113986" cy="2914668"/>
-              <a:chOff x="2117559" y="3146330"/>
-              <a:chExt cx="8113986" cy="2914668"/>
+              <a:off x="2340843" y="180141"/>
+              <a:ext cx="8200926" cy="2997629"/>
+              <a:chOff x="2117559" y="3015014"/>
+              <a:chExt cx="8200926" cy="2997629"/>
             </a:xfrm>
           </p:grpSpPr>
           <p:grpSp>
@@ -7391,10 +7391,10 @@
             </p:nvGrpSpPr>
             <p:grpSpPr>
               <a:xfrm>
-                <a:off x="2117559" y="3146330"/>
-                <a:ext cx="7188975" cy="2914668"/>
-                <a:chOff x="2947738" y="3183945"/>
-                <a:chExt cx="7188975" cy="2914668"/>
+                <a:off x="2117559" y="3015014"/>
+                <a:ext cx="7610248" cy="2997629"/>
+                <a:chOff x="2947738" y="3052629"/>
+                <a:chExt cx="7610248" cy="2997629"/>
               </a:xfrm>
             </p:grpSpPr>
             <p:grpSp>
@@ -7583,8 +7583,8 @@
               </p:nvSpPr>
               <p:spPr>
                 <a:xfrm>
-                  <a:off x="3889228" y="3670137"/>
-                  <a:ext cx="255198" cy="338554"/>
+                  <a:off x="3776955" y="3484567"/>
+                  <a:ext cx="269626" cy="461665"/>
                 </a:xfrm>
                 <a:prstGeom prst="rect">
                   <a:avLst/>
@@ -7598,17 +7598,21 @@
                 <a:lstStyle/>
                 <a:p>
                   <a:r>
-                    <a:rPr kumimoji="1" lang="en-US" altLang="ja-JP" sz="1600" i="1" dirty="0">
+                    <a:rPr kumimoji="1" lang="en-US" altLang="ja-JP" sz="2400" i="1" dirty="0">
                       <a:solidFill>
                         <a:schemeClr val="accent1"/>
                       </a:solidFill>
+                      <a:latin typeface="Arial" panose="020B0604020202020204" pitchFamily="34" charset="0"/>
+                      <a:cs typeface="Arial" panose="020B0604020202020204" pitchFamily="34" charset="0"/>
                     </a:rPr>
                     <a:t>f</a:t>
                   </a:r>
-                  <a:endParaRPr kumimoji="1" lang="ja-JP" altLang="en-US" sz="1600" i="1" dirty="0">
+                  <a:endParaRPr kumimoji="1" lang="ja-JP" altLang="en-US" sz="2400" i="1" dirty="0">
                     <a:solidFill>
                       <a:schemeClr val="accent1"/>
                     </a:solidFill>
+                    <a:latin typeface="Arial" panose="020B0604020202020204" pitchFamily="34" charset="0"/>
+                    <a:cs typeface="Arial" panose="020B0604020202020204" pitchFamily="34" charset="0"/>
                   </a:endParaRPr>
                 </a:p>
               </p:txBody>
@@ -7849,10 +7853,16 @@
                 <a:p>
                   <a:pPr algn="ctr"/>
                   <a:r>
-                    <a:rPr kumimoji="1" lang="en-US" altLang="ja-JP" sz="1200" dirty="0"/>
+                    <a:rPr kumimoji="1" lang="en-US" altLang="ja-JP" sz="1600" b="1" dirty="0">
+                      <a:latin typeface="Arial" panose="020B0604020202020204" pitchFamily="34" charset="0"/>
+                      <a:cs typeface="Arial" panose="020B0604020202020204" pitchFamily="34" charset="0"/>
+                    </a:rPr>
                     <a:t>Force Gauge</a:t>
                   </a:r>
-                  <a:endParaRPr kumimoji="1" lang="ja-JP" altLang="en-US" sz="1200" dirty="0"/>
+                  <a:endParaRPr kumimoji="1" lang="ja-JP" altLang="en-US" sz="1600" b="1" dirty="0">
+                    <a:latin typeface="Arial" panose="020B0604020202020204" pitchFamily="34" charset="0"/>
+                    <a:cs typeface="Arial" panose="020B0604020202020204" pitchFamily="34" charset="0"/>
+                  </a:endParaRPr>
                 </a:p>
               </p:txBody>
             </p:sp>
@@ -7914,8 +7924,8 @@
               </p:nvSpPr>
               <p:spPr>
                 <a:xfrm>
-                  <a:off x="7894481" y="3660799"/>
-                  <a:ext cx="252948" cy="338554"/>
+                  <a:off x="7943031" y="3520305"/>
+                  <a:ext cx="252948" cy="461665"/>
                 </a:xfrm>
                 <a:prstGeom prst="rect">
                   <a:avLst/>
@@ -7929,17 +7939,21 @@
                 <a:lstStyle/>
                 <a:p>
                   <a:r>
-                    <a:rPr kumimoji="1" lang="en-US" altLang="ja-JP" sz="1600" i="1" dirty="0">
+                    <a:rPr kumimoji="1" lang="en-US" altLang="ja-JP" sz="2400" i="1" dirty="0">
                       <a:solidFill>
                         <a:schemeClr val="accent1"/>
                       </a:solidFill>
+                      <a:latin typeface="Arial" panose="020B0604020202020204" pitchFamily="34" charset="0"/>
+                      <a:cs typeface="Arial" panose="020B0604020202020204" pitchFamily="34" charset="0"/>
                     </a:rPr>
                     <a:t>f</a:t>
                   </a:r>
-                  <a:endParaRPr kumimoji="1" lang="ja-JP" altLang="en-US" sz="1600" i="1" dirty="0">
+                  <a:endParaRPr kumimoji="1" lang="ja-JP" altLang="en-US" sz="2400" i="1" dirty="0">
                     <a:solidFill>
                       <a:schemeClr val="accent1"/>
                     </a:solidFill>
+                    <a:latin typeface="Arial" panose="020B0604020202020204" pitchFamily="34" charset="0"/>
+                    <a:cs typeface="Arial" panose="020B0604020202020204" pitchFamily="34" charset="0"/>
                   </a:endParaRPr>
                 </a:p>
               </p:txBody>
@@ -7958,8 +7972,8 @@
               </p:nvSpPr>
               <p:spPr>
                 <a:xfrm>
-                  <a:off x="6336033" y="3188148"/>
-                  <a:ext cx="245580" cy="369332"/>
+                  <a:off x="6337008" y="3090744"/>
+                  <a:ext cx="253596" cy="461665"/>
                 </a:xfrm>
                 <a:prstGeom prst="rect">
                   <a:avLst/>
@@ -7973,10 +7987,12 @@
                 <a:lstStyle/>
                 <a:p>
                   <a:r>
-                    <a:rPr kumimoji="1" lang="en-US" altLang="ja-JP" i="1" dirty="0">
+                    <a:rPr kumimoji="1" lang="en-US" altLang="ja-JP" sz="2400" i="1" dirty="0">
                       <a:solidFill>
                         <a:schemeClr val="accent2"/>
                       </a:solidFill>
+                      <a:latin typeface="Arial" panose="020B0604020202020204" pitchFamily="34" charset="0"/>
+                      <a:cs typeface="Arial" panose="020B0604020202020204" pitchFamily="34" charset="0"/>
                     </a:rPr>
                     <a:t>l</a:t>
                   </a:r>
@@ -7984,6 +8000,8 @@
                     <a:solidFill>
                       <a:schemeClr val="accent2"/>
                     </a:solidFill>
+                    <a:latin typeface="Arial" panose="020B0604020202020204" pitchFamily="34" charset="0"/>
+                    <a:cs typeface="Arial" panose="020B0604020202020204" pitchFamily="34" charset="0"/>
                   </a:endParaRPr>
                 </a:p>
               </p:txBody>
@@ -8102,7 +8120,7 @@
               </p:nvSpPr>
               <p:spPr>
                 <a:xfrm>
-                  <a:off x="8147429" y="5498676"/>
+                  <a:off x="7916789" y="5367341"/>
                   <a:ext cx="236950" cy="233629"/>
                 </a:xfrm>
                 <a:prstGeom prst="rect">
@@ -8152,13 +8170,14 @@
                 </p:cNvPr>
                 <p:cNvCxnSpPr>
                   <a:cxnSpLocks/>
+                  <a:endCxn id="57" idx="1"/>
                 </p:cNvCxnSpPr>
                 <p:nvPr/>
               </p:nvCxnSpPr>
               <p:spPr>
                 <a:xfrm>
-                  <a:off x="8384379" y="5601784"/>
-                  <a:ext cx="722214" cy="0"/>
+                  <a:off x="8150321" y="5496463"/>
+                  <a:ext cx="1043212" cy="0"/>
                 </a:xfrm>
                 <a:prstGeom prst="line">
                   <a:avLst/>
@@ -8198,8 +8217,8 @@
               </p:nvSpPr>
               <p:spPr>
                 <a:xfrm>
-                  <a:off x="9065903" y="5097607"/>
-                  <a:ext cx="1070810" cy="1001006"/>
+                  <a:off x="9135153" y="5015123"/>
+                  <a:ext cx="1422833" cy="909634"/>
                 </a:xfrm>
                 <a:prstGeom prst="rect">
                   <a:avLst/>
@@ -8247,8 +8266,8 @@
               </p:nvSpPr>
               <p:spPr>
                 <a:xfrm>
-                  <a:off x="6173721" y="4488465"/>
-                  <a:ext cx="1096775" cy="276999"/>
+                  <a:off x="5805927" y="4457364"/>
+                  <a:ext cx="1468672" cy="338554"/>
                 </a:xfrm>
                 <a:prstGeom prst="rect">
                   <a:avLst/>
@@ -8262,10 +8281,16 @@
                 <a:lstStyle/>
                 <a:p>
                   <a:r>
-                    <a:rPr kumimoji="1" lang="en-US" altLang="ja-JP" sz="1200" dirty="0"/>
+                    <a:rPr kumimoji="1" lang="en-US" altLang="ja-JP" sz="1600" b="1" dirty="0">
+                      <a:latin typeface="Arial" panose="020B0604020202020204" pitchFamily="34" charset="0"/>
+                      <a:cs typeface="Arial" panose="020B0604020202020204" pitchFamily="34" charset="0"/>
+                    </a:rPr>
                     <a:t>Linear Guide</a:t>
                   </a:r>
-                  <a:endParaRPr kumimoji="1" lang="ja-JP" altLang="en-US" sz="1200" dirty="0"/>
+                  <a:endParaRPr kumimoji="1" lang="ja-JP" altLang="en-US" sz="1600" b="1" dirty="0">
+                    <a:latin typeface="Arial" panose="020B0604020202020204" pitchFamily="34" charset="0"/>
+                    <a:cs typeface="Arial" panose="020B0604020202020204" pitchFamily="34" charset="0"/>
+                  </a:endParaRPr>
                 </a:p>
               </p:txBody>
             </p:sp>
@@ -8283,8 +8308,8 @@
               </p:nvSpPr>
               <p:spPr>
                 <a:xfrm>
-                  <a:off x="7743754" y="3183945"/>
-                  <a:ext cx="1136850" cy="276999"/>
+                  <a:off x="7854705" y="3052629"/>
+                  <a:ext cx="1338828" cy="307777"/>
                 </a:xfrm>
                 <a:prstGeom prst="rect">
                   <a:avLst/>
@@ -8298,18 +8323,30 @@
                 <a:lstStyle/>
                 <a:p>
                   <a:r>
-                    <a:rPr lang="en-US" altLang="ja-JP" sz="1200" dirty="0"/>
+                    <a:rPr lang="en-US" altLang="ja-JP" sz="1400" b="1" dirty="0">
+                      <a:latin typeface="Arial" panose="020B0604020202020204" pitchFamily="34" charset="0"/>
+                      <a:cs typeface="Arial" panose="020B0604020202020204" pitchFamily="34" charset="0"/>
+                    </a:rPr>
                     <a:t>Wire</a:t>
                   </a:r>
                   <a:r>
-                    <a:rPr lang="ja-JP" altLang="en-US" sz="1200" dirty="0"/>
+                    <a:rPr lang="ja-JP" altLang="en-US" sz="1400" b="1" dirty="0">
+                      <a:latin typeface="Arial" panose="020B0604020202020204" pitchFamily="34" charset="0"/>
+                      <a:cs typeface="Arial" panose="020B0604020202020204" pitchFamily="34" charset="0"/>
+                    </a:rPr>
                     <a:t> </a:t>
                   </a:r>
                   <a:r>
-                    <a:rPr lang="en-US" altLang="ja-JP" sz="1200" dirty="0"/>
+                    <a:rPr lang="en-US" altLang="ja-JP" sz="1400" b="1" dirty="0">
+                      <a:latin typeface="Arial" panose="020B0604020202020204" pitchFamily="34" charset="0"/>
+                      <a:cs typeface="Arial" panose="020B0604020202020204" pitchFamily="34" charset="0"/>
+                    </a:rPr>
                     <a:t>Encoder</a:t>
                   </a:r>
-                  <a:endParaRPr kumimoji="1" lang="ja-JP" altLang="en-US" sz="1200" dirty="0"/>
+                  <a:endParaRPr kumimoji="1" lang="ja-JP" altLang="en-US" sz="1400" b="1" dirty="0">
+                    <a:latin typeface="Arial" panose="020B0604020202020204" pitchFamily="34" charset="0"/>
+                    <a:cs typeface="Arial" panose="020B0604020202020204" pitchFamily="34" charset="0"/>
+                  </a:endParaRPr>
                 </a:p>
               </p:txBody>
             </p:sp>
@@ -8327,8 +8364,8 @@
               </p:nvSpPr>
               <p:spPr>
                 <a:xfrm>
-                  <a:off x="7711045" y="5757797"/>
-                  <a:ext cx="1354858" cy="276999"/>
+                  <a:off x="7077083" y="5711704"/>
+                  <a:ext cx="1824538" cy="338554"/>
                 </a:xfrm>
                 <a:prstGeom prst="rect">
                   <a:avLst/>
@@ -8342,10 +8379,16 @@
                 <a:lstStyle/>
                 <a:p>
                   <a:r>
-                    <a:rPr kumimoji="1" lang="en-US" altLang="ja-JP" sz="1200" dirty="0"/>
+                    <a:rPr kumimoji="1" lang="en-US" altLang="ja-JP" sz="1600" b="1" dirty="0">
+                      <a:latin typeface="Arial" panose="020B0604020202020204" pitchFamily="34" charset="0"/>
+                      <a:cs typeface="Arial" panose="020B0604020202020204" pitchFamily="34" charset="0"/>
+                    </a:rPr>
                     <a:t>Pressure Sensor</a:t>
                   </a:r>
-                  <a:endParaRPr kumimoji="1" lang="ja-JP" altLang="en-US" sz="1200" dirty="0"/>
+                  <a:endParaRPr kumimoji="1" lang="ja-JP" altLang="en-US" sz="1600" b="1" dirty="0">
+                    <a:latin typeface="Arial" panose="020B0604020202020204" pitchFamily="34" charset="0"/>
+                    <a:cs typeface="Arial" panose="020B0604020202020204" pitchFamily="34" charset="0"/>
+                  </a:endParaRPr>
                 </a:p>
               </p:txBody>
             </p:sp>
@@ -8363,8 +8406,8 @@
               </p:nvSpPr>
               <p:spPr>
                 <a:xfrm>
-                  <a:off x="7980035" y="5023272"/>
-                  <a:ext cx="256202" cy="369332"/>
+                  <a:off x="7576689" y="4739576"/>
+                  <a:ext cx="256202" cy="461665"/>
                 </a:xfrm>
                 <a:prstGeom prst="rect">
                   <a:avLst/>
@@ -8378,17 +8421,21 @@
                 <a:lstStyle/>
                 <a:p>
                   <a:r>
-                    <a:rPr lang="en-US" altLang="ja-JP" i="1" dirty="0">
+                    <a:rPr lang="en-US" altLang="ja-JP" sz="2400" i="1" dirty="0">
                       <a:solidFill>
                         <a:srgbClr val="00B050"/>
                       </a:solidFill>
+                      <a:latin typeface="Arial" panose="020B0604020202020204" pitchFamily="34" charset="0"/>
+                      <a:cs typeface="Arial" panose="020B0604020202020204" pitchFamily="34" charset="0"/>
                     </a:rPr>
                     <a:t>p</a:t>
                   </a:r>
-                  <a:endParaRPr kumimoji="1" lang="ja-JP" altLang="en-US" i="1" dirty="0">
+                  <a:endParaRPr kumimoji="1" lang="ja-JP" altLang="en-US" sz="2400" i="1" dirty="0">
                     <a:solidFill>
                       <a:srgbClr val="00B050"/>
                     </a:solidFill>
+                    <a:latin typeface="Arial" panose="020B0604020202020204" pitchFamily="34" charset="0"/>
+                    <a:cs typeface="Arial" panose="020B0604020202020204" pitchFamily="34" charset="0"/>
                   </a:endParaRPr>
                 </a:p>
               </p:txBody>
@@ -8408,8 +8455,8 @@
             </p:nvSpPr>
             <p:spPr>
               <a:xfrm>
-                <a:off x="8276414" y="5452692"/>
-                <a:ext cx="1955131" cy="276999"/>
+                <a:off x="8363354" y="5289571"/>
+                <a:ext cx="1955131" cy="338554"/>
               </a:xfrm>
               <a:prstGeom prst="rect">
                 <a:avLst/>
@@ -8423,10 +8470,17 @@
               <a:lstStyle/>
               <a:p>
                 <a:r>
-                  <a:rPr kumimoji="1" lang="en-US" altLang="ja-JP" sz="1200" dirty="0"/>
-                  <a:t>Compressor</a:t>
+                  <a:rPr kumimoji="1" lang="en-US" altLang="ja-JP" sz="1600" b="1" dirty="0">
+                    <a:latin typeface="Arial" panose="020B0604020202020204" pitchFamily="34" charset="0"/>
+                    <a:cs typeface="Arial" panose="020B0604020202020204" pitchFamily="34" charset="0"/>
+                  </a:rPr>
+                  <a:t>Compresso</a:t>
                 </a:r>
-                <a:endParaRPr kumimoji="1" lang="ja-JP" altLang="en-US" sz="1200" dirty="0"/>
+                <a:r>
+                  <a:rPr kumimoji="1" lang="en-US" altLang="ja-JP" sz="1600" b="1" dirty="0"/>
+                  <a:t>r</a:t>
+                </a:r>
+                <a:endParaRPr kumimoji="1" lang="ja-JP" altLang="en-US" sz="1600" b="1" dirty="0"/>
               </a:p>
             </p:txBody>
           </p:sp>
@@ -9666,8 +9720,8 @@
             </p:nvSpPr>
             <p:spPr>
               <a:xfrm>
-                <a:off x="5415595" y="1007510"/>
-                <a:ext cx="526106" cy="276999"/>
+                <a:off x="5354231" y="987298"/>
+                <a:ext cx="624658" cy="338554"/>
               </a:xfrm>
               <a:prstGeom prst="rect">
                 <a:avLst/>
@@ -9681,17 +9735,21 @@
               <a:lstStyle/>
               <a:p>
                 <a:r>
-                  <a:rPr kumimoji="1" lang="en-US" altLang="ja-JP" sz="1200" dirty="0">
+                  <a:rPr kumimoji="1" lang="en-US" altLang="ja-JP" sz="1600" b="1" dirty="0">
                     <a:solidFill>
                       <a:schemeClr val="bg1"/>
                     </a:solidFill>
+                    <a:latin typeface="Arial" panose="020B0604020202020204" pitchFamily="34" charset="0"/>
+                    <a:cs typeface="Arial" panose="020B0604020202020204" pitchFamily="34" charset="0"/>
                   </a:rPr>
                   <a:t>PAM</a:t>
                 </a:r>
-                <a:endParaRPr kumimoji="1" lang="ja-JP" altLang="en-US" sz="1200" dirty="0">
+                <a:endParaRPr kumimoji="1" lang="ja-JP" altLang="en-US" sz="1600" b="1" dirty="0">
                   <a:solidFill>
                     <a:schemeClr val="bg1"/>
                   </a:solidFill>
+                  <a:latin typeface="Arial" panose="020B0604020202020204" pitchFamily="34" charset="0"/>
+                  <a:cs typeface="Arial" panose="020B0604020202020204" pitchFamily="34" charset="0"/>
                 </a:endParaRPr>
               </a:p>
             </p:txBody>

</xml_diff>